<commit_message>
A few more updates to recitation3.
</commit_message>
<xml_diff>
--- a/recitation3/src/recitation3-version_control.pptx
+++ b/recitation3/src/recitation3-version_control.pptx
@@ -7,6 +7,9 @@
   <p:notesMasterIdLst>
     <p:notesMasterId r:id="rId30"/>
   </p:notesMasterIdLst>
+  <p:handoutMasterIdLst>
+    <p:handoutMasterId r:id="rId31"/>
+  </p:handoutMasterIdLst>
   <p:sldIdLst>
     <p:sldId id="256" r:id="rId2"/>
     <p:sldId id="257" r:id="rId3"/>
@@ -205,6 +208,171 @@
     </a:lvl9pPr>
   </p:defaultTextStyle>
 </p:presentation>
+</file>
+
+<file path=ppt/handoutMasters/handoutMaster1.xml><?xml version="1.0" encoding="utf-8"?>
+<p:handoutMaster xmlns:a="http://schemas.openxmlformats.org/drawingml/2006/main" xmlns:r="http://schemas.openxmlformats.org/officeDocument/2006/relationships" xmlns:p="http://schemas.openxmlformats.org/presentationml/2006/main">
+  <p:cSld>
+    <p:bg>
+      <p:bgRef idx="1001">
+        <a:schemeClr val="bg1"/>
+      </p:bgRef>
+    </p:bg>
+    <p:spTree>
+      <p:nvGrpSpPr>
+        <p:cNvPr id="1" name=""/>
+        <p:cNvGrpSpPr/>
+        <p:nvPr/>
+      </p:nvGrpSpPr>
+      <p:grpSpPr>
+        <a:xfrm>
+          <a:off x="0" y="0"/>
+          <a:ext cx="0" cy="0"/>
+          <a:chOff x="0" y="0"/>
+          <a:chExt cx="0" cy="0"/>
+        </a:xfrm>
+      </p:grpSpPr>
+      <p:sp>
+        <p:nvSpPr>
+          <p:cNvPr id="2" name="Header Placeholder 1"/>
+          <p:cNvSpPr>
+            <a:spLocks noGrp="1"/>
+          </p:cNvSpPr>
+          <p:nvPr>
+            <p:ph type="hdr" sz="quarter"/>
+          </p:nvPr>
+        </p:nvSpPr>
+        <p:spPr>
+          <a:xfrm>
+            <a:off x="0" y="0"/>
+            <a:ext cx="2971800" cy="457200"/>
+          </a:xfrm>
+          <a:prstGeom prst="rect">
+            <a:avLst/>
+          </a:prstGeom>
+        </p:spPr>
+        <p:txBody>
+          <a:bodyPr vert="horz" lIns="91440" tIns="45720" rIns="91440" bIns="45720" rtlCol="0"/>
+          <a:lstStyle>
+            <a:lvl1pPr algn="l">
+              <a:defRPr sz="1200"/>
+            </a:lvl1pPr>
+          </a:lstStyle>
+          <a:p>
+            <a:endParaRPr lang="en-US"/>
+          </a:p>
+        </p:txBody>
+      </p:sp>
+      <p:sp>
+        <p:nvSpPr>
+          <p:cNvPr id="3" name="Date Placeholder 2"/>
+          <p:cNvSpPr>
+            <a:spLocks noGrp="1"/>
+          </p:cNvSpPr>
+          <p:nvPr>
+            <p:ph type="dt" sz="quarter" idx="1"/>
+          </p:nvPr>
+        </p:nvSpPr>
+        <p:spPr>
+          <a:xfrm>
+            <a:off x="3884613" y="0"/>
+            <a:ext cx="2971800" cy="457200"/>
+          </a:xfrm>
+          <a:prstGeom prst="rect">
+            <a:avLst/>
+          </a:prstGeom>
+        </p:spPr>
+        <p:txBody>
+          <a:bodyPr vert="horz" lIns="91440" tIns="45720" rIns="91440" bIns="45720" rtlCol="0"/>
+          <a:lstStyle>
+            <a:lvl1pPr algn="r">
+              <a:defRPr sz="1200"/>
+            </a:lvl1pPr>
+          </a:lstStyle>
+          <a:p>
+            <a:fld id="{BB87F918-071B-4892-93AD-B0B956F36AEA}" type="datetimeFigureOut">
+              <a:rPr lang="en-US" smtClean="0"/>
+              <a:t>9/13/2013</a:t>
+            </a:fld>
+            <a:endParaRPr lang="en-US"/>
+          </a:p>
+        </p:txBody>
+      </p:sp>
+      <p:sp>
+        <p:nvSpPr>
+          <p:cNvPr id="4" name="Footer Placeholder 3"/>
+          <p:cNvSpPr>
+            <a:spLocks noGrp="1"/>
+          </p:cNvSpPr>
+          <p:nvPr>
+            <p:ph type="ftr" sz="quarter" idx="2"/>
+          </p:nvPr>
+        </p:nvSpPr>
+        <p:spPr>
+          <a:xfrm>
+            <a:off x="0" y="8685213"/>
+            <a:ext cx="2971800" cy="457200"/>
+          </a:xfrm>
+          <a:prstGeom prst="rect">
+            <a:avLst/>
+          </a:prstGeom>
+        </p:spPr>
+        <p:txBody>
+          <a:bodyPr vert="horz" lIns="91440" tIns="45720" rIns="91440" bIns="45720" rtlCol="0" anchor="b"/>
+          <a:lstStyle>
+            <a:lvl1pPr algn="l">
+              <a:defRPr sz="1200"/>
+            </a:lvl1pPr>
+          </a:lstStyle>
+          <a:p>
+            <a:endParaRPr lang="en-US"/>
+          </a:p>
+        </p:txBody>
+      </p:sp>
+      <p:sp>
+        <p:nvSpPr>
+          <p:cNvPr id="5" name="Slide Number Placeholder 4"/>
+          <p:cNvSpPr>
+            <a:spLocks noGrp="1"/>
+          </p:cNvSpPr>
+          <p:nvPr>
+            <p:ph type="sldNum" sz="quarter" idx="3"/>
+          </p:nvPr>
+        </p:nvSpPr>
+        <p:spPr>
+          <a:xfrm>
+            <a:off x="3884613" y="8685213"/>
+            <a:ext cx="2971800" cy="457200"/>
+          </a:xfrm>
+          <a:prstGeom prst="rect">
+            <a:avLst/>
+          </a:prstGeom>
+        </p:spPr>
+        <p:txBody>
+          <a:bodyPr vert="horz" lIns="91440" tIns="45720" rIns="91440" bIns="45720" rtlCol="0" anchor="b"/>
+          <a:lstStyle>
+            <a:lvl1pPr algn="r">
+              <a:defRPr sz="1200"/>
+            </a:lvl1pPr>
+          </a:lstStyle>
+          <a:p>
+            <a:fld id="{FA88CC99-7098-4FFF-A9B1-94C1F1CF48D5}" type="slidenum">
+              <a:rPr lang="en-US" smtClean="0"/>
+              <a:t>‹#›</a:t>
+            </a:fld>
+            <a:endParaRPr lang="en-US"/>
+          </a:p>
+        </p:txBody>
+      </p:sp>
+    </p:spTree>
+    <p:extLst>
+      <p:ext uri="{BB962C8B-B14F-4D97-AF65-F5344CB8AC3E}">
+        <p14:creationId xmlns:p14="http://schemas.microsoft.com/office/powerpoint/2010/main" val="797050001"/>
+      </p:ext>
+    </p:extLst>
+  </p:cSld>
+  <p:clrMap bg1="lt1" tx1="dk1" bg2="lt2" tx2="dk2" accent1="accent1" accent2="accent2" accent3="accent3" accent4="accent4" accent5="accent5" accent6="accent6" hlink="hlink" folHlink="folHlink"/>
+</p:handoutMaster>
 </file>
 
 <file path=ppt/notesMasters/notesMaster1.xml><?xml version="1.0" encoding="utf-8"?>
@@ -3679,6 +3847,86 @@
           </a:p>
         </p:txBody>
       </p:sp>
+      <p:pic>
+        <p:nvPicPr>
+          <p:cNvPr id="10" name="Picture 2"/>
+          <p:cNvPicPr>
+            <a:picLocks noChangeAspect="1" noChangeArrowheads="1"/>
+          </p:cNvPicPr>
+          <p:nvPr userDrawn="1"/>
+        </p:nvPicPr>
+        <p:blipFill>
+          <a:blip r:embed="rId13">
+            <a:extLst>
+              <a:ext uri="{BEBA8EAE-BF5A-486C-A8C5-ECC9F3942E4B}">
+                <a14:imgProps xmlns:a14="http://schemas.microsoft.com/office/drawing/2010/main">
+                  <a14:imgLayer r:embed="rId14">
+                    <a14:imgEffect>
+                      <a14:backgroundRemoval t="1471" b="100000" l="0" r="95313">
+                        <a14:foregroundMark x1="84375" y1="2941" x2="95313" y2="11765"/>
+                        <a14:foregroundMark x1="1563" y1="83824" x2="1563" y2="88235"/>
+                        <a14:foregroundMark x1="7813" y1="94118" x2="14063" y2="94118"/>
+                        <a14:foregroundMark x1="28125" y1="79412" x2="60938" y2="94118"/>
+                        <a14:foregroundMark x1="21875" y1="80882" x2="15625" y2="89706"/>
+                        <a14:foregroundMark x1="65625" y1="97059" x2="84375" y2="97059"/>
+                        <a14:foregroundMark x1="82813" y1="98529" x2="68750" y2="98529"/>
+                        <a14:foregroundMark x1="42188" y1="91176" x2="35938" y2="94118"/>
+                        <a14:foregroundMark x1="7813" y1="94118" x2="0" y2="89706"/>
+                        <a14:backgroundMark x1="37500" y1="88235" x2="32813" y2="88235"/>
+                        <a14:backgroundMark x1="21875" y1="86765" x2="20313" y2="95588"/>
+                        <a14:backgroundMark x1="18750" y1="92647" x2="14063" y2="98529"/>
+                        <a14:backgroundMark x1="21875" y1="77941" x2="18750" y2="77941"/>
+                        <a14:backgroundMark x1="51563" y1="97059" x2="39063" y2="98529"/>
+                        <a14:backgroundMark x1="18750" y1="97059" x2="1563" y2="98529"/>
+                      </a14:backgroundRemoval>
+                    </a14:imgEffect>
+                  </a14:imgLayer>
+                </a14:imgProps>
+              </a:ext>
+              <a:ext uri="{28A0092B-C50C-407E-A947-70E740481C1C}">
+                <a14:useLocalDpi xmlns:a14="http://schemas.microsoft.com/office/drawing/2010/main" val="0"/>
+              </a:ext>
+            </a:extLst>
+          </a:blip>
+          <a:srcRect/>
+          <a:stretch>
+            <a:fillRect/>
+          </a:stretch>
+        </p:blipFill>
+        <p:spPr bwMode="auto">
+          <a:xfrm>
+            <a:off x="2514600" y="6400800"/>
+            <a:ext cx="457200" cy="485775"/>
+          </a:xfrm>
+          <a:prstGeom prst="rect">
+            <a:avLst/>
+          </a:prstGeom>
+          <a:noFill/>
+          <a:ln>
+            <a:noFill/>
+          </a:ln>
+          <a:extLst>
+            <a:ext uri="{909E8E84-426E-40DD-AFC4-6F175D3DCCD1}">
+              <a14:hiddenFill xmlns:a14="http://schemas.microsoft.com/office/drawing/2010/main">
+                <a:solidFill>
+                  <a:schemeClr val="bg1"/>
+                </a:solidFill>
+              </a14:hiddenFill>
+            </a:ext>
+            <a:ext uri="{91240B29-F687-4F45-9708-019B960494DF}">
+              <a14:hiddenLine xmlns:a14="http://schemas.microsoft.com/office/drawing/2010/main" w="9525" cap="flat" cmpd="sng" algn="ctr">
+                <a:solidFill>
+                  <a:schemeClr val="tx1"/>
+                </a:solidFill>
+                <a:prstDash val="solid"/>
+                <a:miter lim="800000"/>
+                <a:headEnd type="none" w="med" len="med"/>
+                <a:tailEnd type="none" w="med" len="med"/>
+              </a14:hiddenLine>
+            </a:ext>
+          </a:extLst>
+        </p:spPr>
+      </p:pic>
     </p:spTree>
   </p:cSld>
   <p:clrMap bg1="lt1" tx1="dk1" bg2="lt2" tx2="dk2" accent1="accent1" accent2="accent2" accent3="accent3" accent4="accent4" accent5="accent5" accent6="accent6" hlink="hlink" folHlink="folHlink"/>
@@ -12526,4 +12774,289 @@
   <a:objectDefaults/>
   <a:extraClrSchemeLst/>
 </a:theme>
+</file>
+
+<file path=ppt/theme/theme3.xml><?xml version="1.0" encoding="utf-8"?>
+<a:theme xmlns:a="http://schemas.openxmlformats.org/drawingml/2006/main" name="Office Theme">
+  <a:themeElements>
+    <a:clrScheme name="Office">
+      <a:dk1>
+        <a:sysClr val="windowText" lastClr="000000"/>
+      </a:dk1>
+      <a:lt1>
+        <a:sysClr val="window" lastClr="FFFFFF"/>
+      </a:lt1>
+      <a:dk2>
+        <a:srgbClr val="1F497D"/>
+      </a:dk2>
+      <a:lt2>
+        <a:srgbClr val="EEECE1"/>
+      </a:lt2>
+      <a:accent1>
+        <a:srgbClr val="4F81BD"/>
+      </a:accent1>
+      <a:accent2>
+        <a:srgbClr val="C0504D"/>
+      </a:accent2>
+      <a:accent3>
+        <a:srgbClr val="9BBB59"/>
+      </a:accent3>
+      <a:accent4>
+        <a:srgbClr val="8064A2"/>
+      </a:accent4>
+      <a:accent5>
+        <a:srgbClr val="4BACC6"/>
+      </a:accent5>
+      <a:accent6>
+        <a:srgbClr val="F79646"/>
+      </a:accent6>
+      <a:hlink>
+        <a:srgbClr val="0000FF"/>
+      </a:hlink>
+      <a:folHlink>
+        <a:srgbClr val="800080"/>
+      </a:folHlink>
+    </a:clrScheme>
+    <a:fontScheme name="Office">
+      <a:majorFont>
+        <a:latin typeface="Calibri"/>
+        <a:ea typeface=""/>
+        <a:cs typeface=""/>
+        <a:font script="Jpan" typeface="ＭＳ Ｐゴシック"/>
+        <a:font script="Hang" typeface="맑은 고딕"/>
+        <a:font script="Hans" typeface="宋体"/>
+        <a:font script="Hant" typeface="新細明體"/>
+        <a:font script="Arab" typeface="Times New Roman"/>
+        <a:font script="Hebr" typeface="Times New Roman"/>
+        <a:font script="Thai" typeface="Angsana New"/>
+        <a:font script="Ethi" typeface="Nyala"/>
+        <a:font script="Beng" typeface="Vrinda"/>
+        <a:font script="Gujr" typeface="Shruti"/>
+        <a:font script="Khmr" typeface="MoolBoran"/>
+        <a:font script="Knda" typeface="Tunga"/>
+        <a:font script="Guru" typeface="Raavi"/>
+        <a:font script="Cans" typeface="Euphemia"/>
+        <a:font script="Cher" typeface="Plantagenet Cherokee"/>
+        <a:font script="Yiii" typeface="Microsoft Yi Baiti"/>
+        <a:font script="Tibt" typeface="Microsoft Himalaya"/>
+        <a:font script="Thaa" typeface="MV Boli"/>
+        <a:font script="Deva" typeface="Mangal"/>
+        <a:font script="Telu" typeface="Gautami"/>
+        <a:font script="Taml" typeface="Latha"/>
+        <a:font script="Syrc" typeface="Estrangelo Edessa"/>
+        <a:font script="Orya" typeface="Kalinga"/>
+        <a:font script="Mlym" typeface="Kartika"/>
+        <a:font script="Laoo" typeface="DokChampa"/>
+        <a:font script="Sinh" typeface="Iskoola Pota"/>
+        <a:font script="Mong" typeface="Mongolian Baiti"/>
+        <a:font script="Viet" typeface="Times New Roman"/>
+        <a:font script="Uigh" typeface="Microsoft Uighur"/>
+        <a:font script="Geor" typeface="Sylfaen"/>
+      </a:majorFont>
+      <a:minorFont>
+        <a:latin typeface="Calibri"/>
+        <a:ea typeface=""/>
+        <a:cs typeface=""/>
+        <a:font script="Jpan" typeface="ＭＳ Ｐゴシック"/>
+        <a:font script="Hang" typeface="맑은 고딕"/>
+        <a:font script="Hans" typeface="宋体"/>
+        <a:font script="Hant" typeface="新細明體"/>
+        <a:font script="Arab" typeface="Arial"/>
+        <a:font script="Hebr" typeface="Arial"/>
+        <a:font script="Thai" typeface="Cordia New"/>
+        <a:font script="Ethi" typeface="Nyala"/>
+        <a:font script="Beng" typeface="Vrinda"/>
+        <a:font script="Gujr" typeface="Shruti"/>
+        <a:font script="Khmr" typeface="DaunPenh"/>
+        <a:font script="Knda" typeface="Tunga"/>
+        <a:font script="Guru" typeface="Raavi"/>
+        <a:font script="Cans" typeface="Euphemia"/>
+        <a:font script="Cher" typeface="Plantagenet Cherokee"/>
+        <a:font script="Yiii" typeface="Microsoft Yi Baiti"/>
+        <a:font script="Tibt" typeface="Microsoft Himalaya"/>
+        <a:font script="Thaa" typeface="MV Boli"/>
+        <a:font script="Deva" typeface="Mangal"/>
+        <a:font script="Telu" typeface="Gautami"/>
+        <a:font script="Taml" typeface="Latha"/>
+        <a:font script="Syrc" typeface="Estrangelo Edessa"/>
+        <a:font script="Orya" typeface="Kalinga"/>
+        <a:font script="Mlym" typeface="Kartika"/>
+        <a:font script="Laoo" typeface="DokChampa"/>
+        <a:font script="Sinh" typeface="Iskoola Pota"/>
+        <a:font script="Mong" typeface="Mongolian Baiti"/>
+        <a:font script="Viet" typeface="Arial"/>
+        <a:font script="Uigh" typeface="Microsoft Uighur"/>
+        <a:font script="Geor" typeface="Sylfaen"/>
+      </a:minorFont>
+    </a:fontScheme>
+    <a:fmtScheme name="Office">
+      <a:fillStyleLst>
+        <a:solidFill>
+          <a:schemeClr val="phClr"/>
+        </a:solidFill>
+        <a:gradFill rotWithShape="1">
+          <a:gsLst>
+            <a:gs pos="0">
+              <a:schemeClr val="phClr">
+                <a:tint val="50000"/>
+                <a:satMod val="300000"/>
+              </a:schemeClr>
+            </a:gs>
+            <a:gs pos="35000">
+              <a:schemeClr val="phClr">
+                <a:tint val="37000"/>
+                <a:satMod val="300000"/>
+              </a:schemeClr>
+            </a:gs>
+            <a:gs pos="100000">
+              <a:schemeClr val="phClr">
+                <a:tint val="15000"/>
+                <a:satMod val="350000"/>
+              </a:schemeClr>
+            </a:gs>
+          </a:gsLst>
+          <a:lin ang="16200000" scaled="1"/>
+        </a:gradFill>
+        <a:gradFill rotWithShape="1">
+          <a:gsLst>
+            <a:gs pos="0">
+              <a:schemeClr val="phClr">
+                <a:shade val="51000"/>
+                <a:satMod val="130000"/>
+              </a:schemeClr>
+            </a:gs>
+            <a:gs pos="80000">
+              <a:schemeClr val="phClr">
+                <a:shade val="93000"/>
+                <a:satMod val="130000"/>
+              </a:schemeClr>
+            </a:gs>
+            <a:gs pos="100000">
+              <a:schemeClr val="phClr">
+                <a:shade val="94000"/>
+                <a:satMod val="135000"/>
+              </a:schemeClr>
+            </a:gs>
+          </a:gsLst>
+          <a:lin ang="16200000" scaled="0"/>
+        </a:gradFill>
+      </a:fillStyleLst>
+      <a:lnStyleLst>
+        <a:ln w="9525" cap="flat" cmpd="sng" algn="ctr">
+          <a:solidFill>
+            <a:schemeClr val="phClr">
+              <a:shade val="95000"/>
+              <a:satMod val="105000"/>
+            </a:schemeClr>
+          </a:solidFill>
+          <a:prstDash val="solid"/>
+        </a:ln>
+        <a:ln w="25400" cap="flat" cmpd="sng" algn="ctr">
+          <a:solidFill>
+            <a:schemeClr val="phClr"/>
+          </a:solidFill>
+          <a:prstDash val="solid"/>
+        </a:ln>
+        <a:ln w="38100" cap="flat" cmpd="sng" algn="ctr">
+          <a:solidFill>
+            <a:schemeClr val="phClr"/>
+          </a:solidFill>
+          <a:prstDash val="solid"/>
+        </a:ln>
+      </a:lnStyleLst>
+      <a:effectStyleLst>
+        <a:effectStyle>
+          <a:effectLst>
+            <a:outerShdw blurRad="40000" dist="20000" dir="5400000" rotWithShape="0">
+              <a:srgbClr val="000000">
+                <a:alpha val="38000"/>
+              </a:srgbClr>
+            </a:outerShdw>
+          </a:effectLst>
+        </a:effectStyle>
+        <a:effectStyle>
+          <a:effectLst>
+            <a:outerShdw blurRad="40000" dist="23000" dir="5400000" rotWithShape="0">
+              <a:srgbClr val="000000">
+                <a:alpha val="35000"/>
+              </a:srgbClr>
+            </a:outerShdw>
+          </a:effectLst>
+        </a:effectStyle>
+        <a:effectStyle>
+          <a:effectLst>
+            <a:outerShdw blurRad="40000" dist="23000" dir="5400000" rotWithShape="0">
+              <a:srgbClr val="000000">
+                <a:alpha val="35000"/>
+              </a:srgbClr>
+            </a:outerShdw>
+          </a:effectLst>
+          <a:scene3d>
+            <a:camera prst="orthographicFront">
+              <a:rot lat="0" lon="0" rev="0"/>
+            </a:camera>
+            <a:lightRig rig="threePt" dir="t">
+              <a:rot lat="0" lon="0" rev="1200000"/>
+            </a:lightRig>
+          </a:scene3d>
+          <a:sp3d>
+            <a:bevelT w="63500" h="25400"/>
+          </a:sp3d>
+        </a:effectStyle>
+      </a:effectStyleLst>
+      <a:bgFillStyleLst>
+        <a:solidFill>
+          <a:schemeClr val="phClr"/>
+        </a:solidFill>
+        <a:gradFill rotWithShape="1">
+          <a:gsLst>
+            <a:gs pos="0">
+              <a:schemeClr val="phClr">
+                <a:tint val="40000"/>
+                <a:satMod val="350000"/>
+              </a:schemeClr>
+            </a:gs>
+            <a:gs pos="40000">
+              <a:schemeClr val="phClr">
+                <a:tint val="45000"/>
+                <a:shade val="99000"/>
+                <a:satMod val="350000"/>
+              </a:schemeClr>
+            </a:gs>
+            <a:gs pos="100000">
+              <a:schemeClr val="phClr">
+                <a:shade val="20000"/>
+                <a:satMod val="255000"/>
+              </a:schemeClr>
+            </a:gs>
+          </a:gsLst>
+          <a:path path="circle">
+            <a:fillToRect l="50000" t="-80000" r="50000" b="180000"/>
+          </a:path>
+        </a:gradFill>
+        <a:gradFill rotWithShape="1">
+          <a:gsLst>
+            <a:gs pos="0">
+              <a:schemeClr val="phClr">
+                <a:tint val="80000"/>
+                <a:satMod val="300000"/>
+              </a:schemeClr>
+            </a:gs>
+            <a:gs pos="100000">
+              <a:schemeClr val="phClr">
+                <a:shade val="30000"/>
+                <a:satMod val="200000"/>
+              </a:schemeClr>
+            </a:gs>
+          </a:gsLst>
+          <a:path path="circle">
+            <a:fillToRect l="50000" t="50000" r="50000" b="50000"/>
+          </a:path>
+        </a:gradFill>
+      </a:bgFillStyleLst>
+    </a:fmtScheme>
+  </a:themeElements>
+  <a:objectDefaults/>
+  <a:extraClrSchemeLst/>
+</a:theme>
 </file>
</xml_diff>

<commit_message>
Fixed error on AFS slide.
</commit_message>
<xml_diff>
--- a/recitation3/src/recitation3-version_control.pptx
+++ b/recitation3/src/recitation3-version_control.pptx
@@ -6495,7 +6495,7 @@
             </a:r>
             <a:r>
               <a:rPr lang="en-US" dirty="0" smtClean="0"/>
-              <a:t> ANDREWID </a:t>
+              <a:t> . ANDREWID </a:t>
             </a:r>
             <a:r>
               <a:rPr lang="en-US" dirty="0" err="1" smtClean="0"/>
@@ -6522,8 +6522,13 @@
             </a:r>
             <a:r>
               <a:rPr lang="en-US" dirty="0" smtClean="0"/>
-              <a:t> --bare</a:t>
-            </a:r>
+              <a:t> </a:t>
+            </a:r>
+            <a:r>
+              <a:rPr lang="en-US" smtClean="0"/>
+              <a:t>--bare</a:t>
+            </a:r>
+            <a:endParaRPr lang="en-US" dirty="0" smtClean="0"/>
           </a:p>
         </p:txBody>
       </p:sp>

</xml_diff>